<commit_message>
final updates for 2015
</commit_message>
<xml_diff>
--- a/pres-source/00-intro.pptx
+++ b/pres-source/00-intro.pptx
@@ -213,7 +213,7 @@
             <a:fld id="{7307762F-A706-E543-A832-3C298AA3103F}" type="datetimeFigureOut">
               <a:rPr lang="en-US" smtClean="0"/>
               <a:pPr/>
-              <a:t>16/11/15</a:t>
+              <a:t>30/11/15</a:t>
             </a:fld>
             <a:endParaRPr lang="en-US" dirty="0"/>
           </a:p>
@@ -780,7 +780,7 @@
           <a:p>
             <a:fld id="{875CF0EB-321F-0749-B37A-89BBA859503C}" type="datetimeFigureOut">
               <a:rPr lang="en-US" smtClean="0"/>
-              <a:t>16/11/15</a:t>
+              <a:t>30/11/15</a:t>
             </a:fld>
             <a:endParaRPr lang="en-US"/>
           </a:p>
@@ -984,7 +984,7 @@
           <a:p>
             <a:fld id="{875CF0EB-321F-0749-B37A-89BBA859503C}" type="datetimeFigureOut">
               <a:rPr lang="en-US" smtClean="0"/>
-              <a:t>16/11/15</a:t>
+              <a:t>30/11/15</a:t>
             </a:fld>
             <a:endParaRPr lang="en-US"/>
           </a:p>
@@ -1178,7 +1178,7 @@
           <a:p>
             <a:fld id="{875CF0EB-321F-0749-B37A-89BBA859503C}" type="datetimeFigureOut">
               <a:rPr lang="en-US" smtClean="0"/>
-              <a:t>16/11/15</a:t>
+              <a:t>30/11/15</a:t>
             </a:fld>
             <a:endParaRPr lang="en-US"/>
           </a:p>
@@ -1448,7 +1448,7 @@
           <a:p>
             <a:fld id="{875CF0EB-321F-0749-B37A-89BBA859503C}" type="datetimeFigureOut">
               <a:rPr lang="en-US" smtClean="0"/>
-              <a:t>16/11/15</a:t>
+              <a:t>30/11/15</a:t>
             </a:fld>
             <a:endParaRPr lang="en-US"/>
           </a:p>
@@ -1760,7 +1760,7 @@
           <a:p>
             <a:fld id="{875CF0EB-321F-0749-B37A-89BBA859503C}" type="datetimeFigureOut">
               <a:rPr lang="en-US" smtClean="0"/>
-              <a:t>16/11/15</a:t>
+              <a:t>30/11/15</a:t>
             </a:fld>
             <a:endParaRPr lang="en-US"/>
           </a:p>
@@ -2206,7 +2206,7 @@
           <a:p>
             <a:fld id="{875CF0EB-321F-0749-B37A-89BBA859503C}" type="datetimeFigureOut">
               <a:rPr lang="en-US" smtClean="0"/>
-              <a:t>16/11/15</a:t>
+              <a:t>30/11/15</a:t>
             </a:fld>
             <a:endParaRPr lang="en-US"/>
           </a:p>
@@ -2348,7 +2348,7 @@
           <a:p>
             <a:fld id="{875CF0EB-321F-0749-B37A-89BBA859503C}" type="datetimeFigureOut">
               <a:rPr lang="en-US" smtClean="0"/>
-              <a:t>16/11/15</a:t>
+              <a:t>30/11/15</a:t>
             </a:fld>
             <a:endParaRPr lang="en-US"/>
           </a:p>
@@ -2467,7 +2467,7 @@
           <a:p>
             <a:fld id="{875CF0EB-321F-0749-B37A-89BBA859503C}" type="datetimeFigureOut">
               <a:rPr lang="en-US" smtClean="0"/>
-              <a:t>16/11/15</a:t>
+              <a:t>30/11/15</a:t>
             </a:fld>
             <a:endParaRPr lang="en-US"/>
           </a:p>
@@ -2768,7 +2768,7 @@
           <a:p>
             <a:fld id="{875CF0EB-321F-0749-B37A-89BBA859503C}" type="datetimeFigureOut">
               <a:rPr lang="en-US" smtClean="0"/>
-              <a:t>16/11/15</a:t>
+              <a:t>30/11/15</a:t>
             </a:fld>
             <a:endParaRPr lang="en-US"/>
           </a:p>
@@ -3045,7 +3045,7 @@
           <a:p>
             <a:fld id="{875CF0EB-321F-0749-B37A-89BBA859503C}" type="datetimeFigureOut">
               <a:rPr lang="en-US" smtClean="0"/>
-              <a:t>16/11/15</a:t>
+              <a:t>30/11/15</a:t>
             </a:fld>
             <a:endParaRPr lang="en-US"/>
           </a:p>
@@ -3241,7 +3241,7 @@
       </p:sp>
       <p:sp>
         <p:nvSpPr>
-          <p:cNvPr id="21" name="TextBox 20"/>
+          <p:cNvPr id="8" name="TextBox 7"/>
           <p:cNvSpPr txBox="1">
             <a:spLocks noChangeArrowheads="1"/>
           </p:cNvSpPr>
@@ -3249,8 +3249,8 @@
         </p:nvSpPr>
         <p:spPr bwMode="auto">
           <a:xfrm>
-            <a:off x="1046163" y="6092834"/>
-            <a:ext cx="6853158" cy="553998"/>
+            <a:off x="1168930" y="6408634"/>
+            <a:ext cx="3429144" cy="415498"/>
           </a:xfrm>
           <a:prstGeom prst="rect">
             <a:avLst/>
@@ -3422,22 +3422,22 @@
               <a:defRPr/>
             </a:pPr>
             <a:r>
-              <a:rPr lang="en-US" sz="1000" dirty="0" smtClean="0">
+              <a:rPr lang="en-US" sz="700" dirty="0" smtClean="0">
                 <a:latin typeface="Montserrat"/>
               </a:rPr>
-              <a:t>© Paul Fremantle 2015.  Licensed under the Creative Commons 4.0 BY-SA (Attribution-</a:t>
-            </a:r>
-            <a:r>
-              <a:rPr lang="en-US" sz="1000" dirty="0" err="1" smtClean="0">
+              <a:t>© Paul Fremantle 2015.  </a:t>
+            </a:r>
+            <a:r>
+              <a:rPr lang="en-US" sz="700" dirty="0" smtClean="0">
                 <a:latin typeface="Montserrat"/>
               </a:rPr>
-              <a:t>Sharealike</a:t>
-            </a:r>
-            <a:r>
-              <a:rPr lang="en-US" sz="1000" dirty="0" smtClean="0">
+              <a:t>This </a:t>
+            </a:r>
+            <a:r>
+              <a:rPr lang="en-US" sz="700" dirty="0" smtClean="0">
                 <a:latin typeface="Montserrat"/>
               </a:rPr>
-              <a:t>) license.</a:t>
+              <a:t>work is licensed under a Creative Commons</a:t>
             </a:r>
           </a:p>
           <a:p>
@@ -3445,87 +3445,84 @@
               <a:defRPr/>
             </a:pPr>
             <a:r>
-              <a:rPr lang="en-US" sz="1000" dirty="0" smtClean="0">
+              <a:rPr lang="en-US" sz="700" dirty="0" smtClean="0">
                 <a:latin typeface="Montserrat"/>
               </a:rPr>
-              <a:t>See </a:t>
-            </a:r>
-            <a:r>
-              <a:rPr lang="en-US" sz="1000" dirty="0" smtClean="0">
+              <a:t> Attribution-</a:t>
+            </a:r>
+            <a:r>
+              <a:rPr lang="en-US" sz="700" dirty="0" err="1" smtClean="0">
+                <a:latin typeface="Montserrat"/>
+              </a:rPr>
+              <a:t>NonCommercial</a:t>
+            </a:r>
+            <a:r>
+              <a:rPr lang="en-US" sz="700" dirty="0" smtClean="0">
+                <a:latin typeface="Montserrat"/>
+              </a:rPr>
+              <a:t>-</a:t>
+            </a:r>
+            <a:r>
+              <a:rPr lang="en-US" sz="700" dirty="0" err="1" smtClean="0">
+                <a:latin typeface="Montserrat"/>
+              </a:rPr>
+              <a:t>ShareAlike</a:t>
+            </a:r>
+            <a:r>
+              <a:rPr lang="en-US" sz="700" dirty="0" smtClean="0">
+                <a:latin typeface="Montserrat"/>
+              </a:rPr>
+              <a:t> 4.0 International License</a:t>
+            </a:r>
+            <a:br>
+              <a:rPr lang="en-US" sz="700" dirty="0" smtClean="0">
+                <a:latin typeface="Montserrat"/>
+              </a:rPr>
+            </a:br>
+            <a:r>
+              <a:rPr lang="en-US" sz="700" dirty="0" smtClean="0">
+                <a:latin typeface="Montserrat"/>
+              </a:rPr>
+              <a:t>See  </a:t>
+            </a:r>
+            <a:r>
+              <a:rPr lang="en-US" sz="700" dirty="0" smtClean="0">
                 <a:latin typeface="Montserrat"/>
                 <a:hlinkClick r:id="rId13"/>
               </a:rPr>
-              <a:t>http://creativecommons.org/licenses/by-sa/4.0/</a:t>
-            </a:r>
-            <a:r>
-              <a:rPr lang="en-US" sz="1000" dirty="0" smtClean="0">
+              <a:t>http://creativecommons.org/licenses/by-nc-sa/4.0/</a:t>
+            </a:r>
+            <a:r>
+              <a:rPr lang="en-US" sz="700" dirty="0" smtClean="0">
                 <a:latin typeface="Montserrat"/>
               </a:rPr>
               <a:t> </a:t>
             </a:r>
-          </a:p>
-          <a:p>
-            <a:pPr algn="l" eaLnBrk="1" hangingPunct="1">
-              <a:defRPr/>
-            </a:pPr>
-            <a:endParaRPr lang="en-US" sz="1000" dirty="0" smtClean="0">
-              <a:latin typeface="Montserrat"/>
-            </a:endParaRPr>
           </a:p>
         </p:txBody>
       </p:sp>
       <p:pic>
         <p:nvPicPr>
-          <p:cNvPr id="24" name="Picture 23"/>
+          <p:cNvPr id="9" name="Picture 8"/>
           <p:cNvPicPr>
-            <a:picLocks noChangeAspect="1" noChangeArrowheads="1"/>
+            <a:picLocks noChangeAspect="1"/>
           </p:cNvPicPr>
           <p:nvPr userDrawn="1"/>
         </p:nvPicPr>
         <p:blipFill>
-          <a:blip r:embed="rId14">
-            <a:extLst>
-              <a:ext uri="{28A0092B-C50C-407E-A947-70E740481C1C}">
-                <a14:useLocalDpi xmlns:a14="http://schemas.microsoft.com/office/drawing/2010/main" val="0"/>
-              </a:ext>
-            </a:extLst>
-          </a:blip>
-          <a:srcRect/>
+          <a:blip r:embed="rId14"/>
           <a:stretch>
             <a:fillRect/>
           </a:stretch>
         </p:blipFill>
-        <p:spPr bwMode="auto">
+        <p:spPr>
           <a:xfrm>
-            <a:off x="320764" y="6254746"/>
-            <a:ext cx="725399" cy="258097"/>
+            <a:off x="375635" y="6492098"/>
+            <a:ext cx="792765" cy="279269"/>
           </a:xfrm>
           <a:prstGeom prst="rect">
             <a:avLst/>
           </a:prstGeom>
-          <a:noFill/>
-          <a:ln>
-            <a:noFill/>
-          </a:ln>
-          <a:extLst>
-            <a:ext uri="{909E8E84-426E-40dd-AFC4-6F175D3DCCD1}">
-              <a14:hiddenFill xmlns:a14="http://schemas.microsoft.com/office/drawing/2010/main">
-                <a:solidFill>
-                  <a:srgbClr val="FFFFFF"/>
-                </a:solidFill>
-              </a14:hiddenFill>
-            </a:ext>
-            <a:ext uri="{91240B29-F687-4f45-9708-019B960494DF}">
-              <a14:hiddenLine xmlns:a14="http://schemas.microsoft.com/office/drawing/2010/main" w="9525">
-                <a:solidFill>
-                  <a:srgbClr val="000000"/>
-                </a:solidFill>
-                <a:miter lim="800000"/>
-                <a:headEnd/>
-                <a:tailEnd/>
-              </a14:hiddenLine>
-            </a:ext>
-          </a:extLst>
         </p:spPr>
       </p:pic>
     </p:spTree>

</xml_diff>